<commit_message>
Update 02.02.2024 - 12:28am
</commit_message>
<xml_diff>
--- a/ARCHIVOS_VARIOS/slides/Presentación-INFO-Curso.pptx
+++ b/ARCHIVOS_VARIOS/slides/Presentación-INFO-Curso.pptx
@@ -119,6 +119,11 @@
       </a:defRPr>
     </a:lvl9pPr>
   </p:defaultTextStyle>
+  <p:extLst>
+    <p:ext uri="{EFAFB233-063F-42B5-8137-9DF3F51BA10A}">
+      <p15:sldGuideLst xmlns:p15="http://schemas.microsoft.com/office/powerpoint/2012/main"/>
+    </p:ext>
+  </p:extLst>
 </p:presentation>
 </file>
 
@@ -3534,7 +3539,29 @@
             <a:rPr lang="es-419" dirty="0">
               <a:latin typeface="Arial Nova Cond" panose="020B0506020202020204" pitchFamily="34" charset="0"/>
             </a:rPr>
-            <a:t>Suscribirse al Canal </a:t>
+            <a:t>Suscribirse al </a:t>
+          </a:r>
+          <a:r>
+            <a:rPr lang="es-419" b="1" dirty="0">
+              <a:solidFill>
+                <a:srgbClr val="00B050"/>
+              </a:solidFill>
+              <a:latin typeface="Arial Nova Cond" panose="020B0506020202020204" pitchFamily="34" charset="0"/>
+              <a:hlinkClick xmlns:r="http://schemas.openxmlformats.org/officeDocument/2006/relationships" r:id="rId1">
+                <a:extLst>
+                  <a:ext uri="{A12FA001-AC4F-418D-AE19-62706E023703}">
+                    <ahyp:hlinkClr xmlns:ahyp="http://schemas.microsoft.com/office/drawing/2018/hyperlinkcolor" val="tx"/>
+                  </a:ext>
+                </a:extLst>
+              </a:hlinkClick>
+            </a:rPr>
+            <a:t>Canal</a:t>
+          </a:r>
+          <a:r>
+            <a:rPr lang="es-419" dirty="0">
+              <a:latin typeface="Arial Nova Cond" panose="020B0506020202020204" pitchFamily="34" charset="0"/>
+            </a:rPr>
+            <a:t> </a:t>
           </a:r>
           <a:r>
             <a:rPr lang="es-419" b="1" dirty="0">
@@ -3584,10 +3611,34 @@
             <a:defRPr cap="all"/>
           </a:pPr>
           <a:r>
+            <a:rPr lang="es-419" b="1" dirty="0">
+              <a:solidFill>
+                <a:srgbClr val="FF0000"/>
+              </a:solidFill>
+              <a:latin typeface="Arial Nova Cond" panose="020B0506020202020204" pitchFamily="34" charset="0"/>
+            </a:rPr>
+            <a:t>Like</a:t>
+          </a:r>
+          <a:r>
             <a:rPr lang="es-419" dirty="0">
               <a:latin typeface="Arial Nova Cond" panose="020B0506020202020204" pitchFamily="34" charset="0"/>
             </a:rPr>
-            <a:t>Like y Compartir con más Personas</a:t>
+            <a:t> y </a:t>
+          </a:r>
+          <a:r>
+            <a:rPr lang="es-419" b="1" dirty="0">
+              <a:solidFill>
+                <a:srgbClr val="FF0000"/>
+              </a:solidFill>
+              <a:latin typeface="Arial Nova Cond" panose="020B0506020202020204" pitchFamily="34" charset="0"/>
+            </a:rPr>
+            <a:t>Compartir</a:t>
+          </a:r>
+          <a:r>
+            <a:rPr lang="es-419" dirty="0">
+              <a:latin typeface="Arial Nova Cond" panose="020B0506020202020204" pitchFamily="34" charset="0"/>
+            </a:rPr>
+            <a:t> con más Personas</a:t>
           </a:r>
           <a:endParaRPr lang="en-US" dirty="0">
             <a:latin typeface="Arial Nova Cond" panose="020B0506020202020204" pitchFamily="34" charset="0"/>
@@ -3649,10 +3700,26 @@
             <a:t> </a:t>
           </a:r>
           <a:r>
+            <a:rPr lang="es-419" b="1" dirty="0">
+              <a:solidFill>
+                <a:srgbClr val="00B050"/>
+              </a:solidFill>
+              <a:latin typeface="Arial Nova Cond" panose="020B0506020202020204" pitchFamily="34" charset="0"/>
+              <a:hlinkClick xmlns:r="http://schemas.openxmlformats.org/officeDocument/2006/relationships" r:id="rId2">
+                <a:extLst>
+                  <a:ext uri="{A12FA001-AC4F-418D-AE19-62706E023703}">
+                    <ahyp:hlinkClr xmlns:ahyp="http://schemas.microsoft.com/office/drawing/2018/hyperlinkcolor" val="tx"/>
+                  </a:ext>
+                </a:extLst>
+              </a:hlinkClick>
+            </a:rPr>
+            <a:t>Link</a:t>
+          </a:r>
+          <a:r>
             <a:rPr lang="es-419" dirty="0">
               <a:latin typeface="Arial Nova Cond" panose="020B0506020202020204" pitchFamily="34" charset="0"/>
             </a:rPr>
-            <a:t>Link de donación PayPal</a:t>
+            <a:t> de donación PayPal</a:t>
           </a:r>
           <a:endParaRPr lang="en-US" dirty="0">
             <a:latin typeface="Arial Nova Cond" panose="020B0506020202020204" pitchFamily="34" charset="0"/>
@@ -3703,7 +3770,7 @@
       <dgm:prSet presAssocID="{C3464F79-25B2-4C8D-9DF0-32957AD13D5F}" presName="iconRect" presStyleLbl="node1" presStyleIdx="0" presStyleCnt="3" custLinFactNeighborY="85567"/>
       <dgm:spPr>
         <a:blipFill>
-          <a:blip xmlns:r="http://schemas.openxmlformats.org/officeDocument/2006/relationships" r:embed="rId1">
+          <a:blip xmlns:r="http://schemas.openxmlformats.org/officeDocument/2006/relationships" r:embed="rId3">
             <a:duotone>
               <a:prstClr val="black"/>
               <a:schemeClr val="accent6">
@@ -3717,7 +3784,7 @@
                 <a14:useLocalDpi xmlns:a14="http://schemas.microsoft.com/office/drawing/2010/main" val="0"/>
               </a:ext>
               <a:ext uri="{96DAC541-7B7A-43D3-8B79-37D633B846F1}">
-                <asvg:svgBlip xmlns:asvg="http://schemas.microsoft.com/office/drawing/2016/SVG/main" r:embed="rId2"/>
+                <asvg:svgBlip xmlns:asvg="http://schemas.microsoft.com/office/drawing/2016/SVG/main" r:embed="rId4"/>
               </a:ext>
             </a:extLst>
           </a:blip>
@@ -3756,7 +3823,7 @@
       <dgm:prSet presAssocID="{D03DD3FE-D9C7-4377-A2B8-20EA6151B681}" presName="iconRect" presStyleLbl="node1" presStyleIdx="1" presStyleCnt="3" custLinFactNeighborY="85567"/>
       <dgm:spPr>
         <a:blipFill>
-          <a:blip xmlns:r="http://schemas.openxmlformats.org/officeDocument/2006/relationships" r:embed="rId3">
+          <a:blip xmlns:r="http://schemas.openxmlformats.org/officeDocument/2006/relationships" r:embed="rId5">
             <a:duotone>
               <a:schemeClr val="accent2">
                 <a:shade val="45000"/>
@@ -3767,7 +3834,7 @@
             <a:lum bright="-40000" contrast="89000"/>
             <a:extLst>
               <a:ext uri="{96DAC541-7B7A-43D3-8B79-37D633B846F1}">
-                <asvg:svgBlip xmlns:asvg="http://schemas.microsoft.com/office/drawing/2016/SVG/main" r:embed="rId4"/>
+                <asvg:svgBlip xmlns:asvg="http://schemas.microsoft.com/office/drawing/2016/SVG/main" r:embed="rId6"/>
               </a:ext>
             </a:extLst>
           </a:blip>
@@ -3807,7 +3874,7 @@
       <dgm:prSet presAssocID="{0A49868F-CB8A-4FE9-9076-02CCD3D7A56D}" presName="iconRect" presStyleLbl="node1" presStyleIdx="2" presStyleCnt="3" custLinFactNeighborY="85567"/>
       <dgm:spPr>
         <a:blipFill>
-          <a:blip xmlns:r="http://schemas.openxmlformats.org/officeDocument/2006/relationships" r:embed="rId5">
+          <a:blip xmlns:r="http://schemas.openxmlformats.org/officeDocument/2006/relationships" r:embed="rId7">
             <a:duotone>
               <a:schemeClr val="accent5">
                 <a:shade val="45000"/>
@@ -3821,7 +3888,7 @@
                 <a14:useLocalDpi xmlns:a14="http://schemas.microsoft.com/office/drawing/2010/main" val="0"/>
               </a:ext>
               <a:ext uri="{96DAC541-7B7A-43D3-8B79-37D633B846F1}">
-                <asvg:svgBlip xmlns:asvg="http://schemas.microsoft.com/office/drawing/2016/SVG/main" r:embed="rId6"/>
+                <asvg:svgBlip xmlns:asvg="http://schemas.microsoft.com/office/drawing/2016/SVG/main" r:embed="rId8"/>
               </a:ext>
             </a:extLst>
           </a:blip>
@@ -5293,7 +5360,29 @@
             <a:rPr lang="es-419" sz="1900" kern="1200" dirty="0">
               <a:latin typeface="Arial Nova Cond" panose="020B0506020202020204" pitchFamily="34" charset="0"/>
             </a:rPr>
-            <a:t>Suscribirse al Canal </a:t>
+            <a:t>Suscribirse al </a:t>
+          </a:r>
+          <a:r>
+            <a:rPr lang="es-419" sz="1900" b="1" kern="1200" dirty="0">
+              <a:solidFill>
+                <a:srgbClr val="00B050"/>
+              </a:solidFill>
+              <a:latin typeface="Arial Nova Cond" panose="020B0506020202020204" pitchFamily="34" charset="0"/>
+              <a:hlinkClick xmlns:r="http://schemas.openxmlformats.org/officeDocument/2006/relationships" r:id="rId3">
+                <a:extLst>
+                  <a:ext uri="{A12FA001-AC4F-418D-AE19-62706E023703}">
+                    <ahyp:hlinkClr xmlns:ahyp="http://schemas.microsoft.com/office/drawing/2018/hyperlinkcolor" val="tx"/>
+                  </a:ext>
+                </a:extLst>
+              </a:hlinkClick>
+            </a:rPr>
+            <a:t>Canal</a:t>
+          </a:r>
+          <a:r>
+            <a:rPr lang="es-419" sz="1900" kern="1200" dirty="0">
+              <a:latin typeface="Arial Nova Cond" panose="020B0506020202020204" pitchFamily="34" charset="0"/>
+            </a:rPr>
+            <a:t> </a:t>
           </a:r>
           <a:r>
             <a:rPr lang="es-419" sz="1900" b="1" kern="1200" dirty="0">
@@ -5365,7 +5454,7 @@
           <a:avLst/>
         </a:prstGeom>
         <a:blipFill>
-          <a:blip xmlns:r="http://schemas.openxmlformats.org/officeDocument/2006/relationships" r:embed="rId3">
+          <a:blip xmlns:r="http://schemas.openxmlformats.org/officeDocument/2006/relationships" r:embed="rId4">
             <a:duotone>
               <a:schemeClr val="accent2">
                 <a:shade val="45000"/>
@@ -5376,7 +5465,7 @@
             <a:lum bright="-40000" contrast="89000"/>
             <a:extLst>
               <a:ext uri="{96DAC541-7B7A-43D3-8B79-37D633B846F1}">
-                <asvg:svgBlip xmlns:asvg="http://schemas.microsoft.com/office/drawing/2016/SVG/main" r:embed="rId4"/>
+                <asvg:svgBlip xmlns:asvg="http://schemas.microsoft.com/office/drawing/2016/SVG/main" r:embed="rId5"/>
               </a:ext>
             </a:extLst>
           </a:blip>
@@ -5462,10 +5551,34 @@
             <a:defRPr cap="all"/>
           </a:pPr>
           <a:r>
+            <a:rPr lang="es-419" sz="1900" b="1" kern="1200" dirty="0">
+              <a:solidFill>
+                <a:srgbClr val="FF0000"/>
+              </a:solidFill>
+              <a:latin typeface="Arial Nova Cond" panose="020B0506020202020204" pitchFamily="34" charset="0"/>
+            </a:rPr>
+            <a:t>Like</a:t>
+          </a:r>
+          <a:r>
             <a:rPr lang="es-419" sz="1900" kern="1200" dirty="0">
               <a:latin typeface="Arial Nova Cond" panose="020B0506020202020204" pitchFamily="34" charset="0"/>
             </a:rPr>
-            <a:t>Like y Compartir con más Personas</a:t>
+            <a:t> y </a:t>
+          </a:r>
+          <a:r>
+            <a:rPr lang="es-419" sz="1900" b="1" kern="1200" dirty="0">
+              <a:solidFill>
+                <a:srgbClr val="FF0000"/>
+              </a:solidFill>
+              <a:latin typeface="Arial Nova Cond" panose="020B0506020202020204" pitchFamily="34" charset="0"/>
+            </a:rPr>
+            <a:t>Compartir</a:t>
+          </a:r>
+          <a:r>
+            <a:rPr lang="es-419" sz="1900" kern="1200" dirty="0">
+              <a:latin typeface="Arial Nova Cond" panose="020B0506020202020204" pitchFamily="34" charset="0"/>
+            </a:rPr>
+            <a:t> con más Personas</a:t>
           </a:r>
           <a:endParaRPr lang="en-US" sz="1900" kern="1200" dirty="0">
             <a:latin typeface="Arial Nova Cond" panose="020B0506020202020204" pitchFamily="34" charset="0"/>
@@ -5531,7 +5644,7 @@
           <a:avLst/>
         </a:prstGeom>
         <a:blipFill>
-          <a:blip xmlns:r="http://schemas.openxmlformats.org/officeDocument/2006/relationships" r:embed="rId5">
+          <a:blip xmlns:r="http://schemas.openxmlformats.org/officeDocument/2006/relationships" r:embed="rId6">
             <a:duotone>
               <a:schemeClr val="accent5">
                 <a:shade val="45000"/>
@@ -5545,7 +5658,7 @@
                 <a14:useLocalDpi xmlns:a14="http://schemas.microsoft.com/office/drawing/2010/main" val="0"/>
               </a:ext>
               <a:ext uri="{96DAC541-7B7A-43D3-8B79-37D633B846F1}">
-                <asvg:svgBlip xmlns:asvg="http://schemas.microsoft.com/office/drawing/2016/SVG/main" r:embed="rId6"/>
+                <asvg:svgBlip xmlns:asvg="http://schemas.microsoft.com/office/drawing/2016/SVG/main" r:embed="rId7"/>
               </a:ext>
             </a:extLst>
           </a:blip>
@@ -5648,10 +5761,26 @@
             <a:t> </a:t>
           </a:r>
           <a:r>
+            <a:rPr lang="es-419" sz="1900" b="1" kern="1200" dirty="0">
+              <a:solidFill>
+                <a:srgbClr val="00B050"/>
+              </a:solidFill>
+              <a:latin typeface="Arial Nova Cond" panose="020B0506020202020204" pitchFamily="34" charset="0"/>
+              <a:hlinkClick xmlns:r="http://schemas.openxmlformats.org/officeDocument/2006/relationships" r:id="rId8">
+                <a:extLst>
+                  <a:ext uri="{A12FA001-AC4F-418D-AE19-62706E023703}">
+                    <ahyp:hlinkClr xmlns:ahyp="http://schemas.microsoft.com/office/drawing/2018/hyperlinkcolor" val="tx"/>
+                  </a:ext>
+                </a:extLst>
+              </a:hlinkClick>
+            </a:rPr>
+            <a:t>Link</a:t>
+          </a:r>
+          <a:r>
             <a:rPr lang="es-419" sz="1900" kern="1200" dirty="0">
               <a:latin typeface="Arial Nova Cond" panose="020B0506020202020204" pitchFamily="34" charset="0"/>
             </a:rPr>
-            <a:t>Link de donación PayPal</a:t>
+            <a:t> de donación PayPal</a:t>
           </a:r>
           <a:endParaRPr lang="en-US" sz="1900" kern="1200" dirty="0">
             <a:latin typeface="Arial Nova Cond" panose="020B0506020202020204" pitchFamily="34" charset="0"/>
@@ -9576,7 +9705,7 @@
           <a:p>
             <a:fld id="{1405C4EA-9AE4-4CD8-88AE-B7C9EA33431D}" type="datetimeFigureOut">
               <a:rPr lang="en-US" smtClean="0"/>
-              <a:t>1/31/2024</a:t>
+              <a:t>2/2/2024</a:t>
             </a:fld>
             <a:endParaRPr lang="en-US"/>
           </a:p>
@@ -9746,7 +9875,7 @@
           <a:p>
             <a:fld id="{1405C4EA-9AE4-4CD8-88AE-B7C9EA33431D}" type="datetimeFigureOut">
               <a:rPr lang="en-US" smtClean="0"/>
-              <a:t>1/31/2024</a:t>
+              <a:t>2/2/2024</a:t>
             </a:fld>
             <a:endParaRPr lang="en-US"/>
           </a:p>
@@ -9926,7 +10055,7 @@
           <a:p>
             <a:fld id="{1405C4EA-9AE4-4CD8-88AE-B7C9EA33431D}" type="datetimeFigureOut">
               <a:rPr lang="en-US" smtClean="0"/>
-              <a:t>1/31/2024</a:t>
+              <a:t>2/2/2024</a:t>
             </a:fld>
             <a:endParaRPr lang="en-US"/>
           </a:p>
@@ -10096,7 +10225,7 @@
           <a:p>
             <a:fld id="{1405C4EA-9AE4-4CD8-88AE-B7C9EA33431D}" type="datetimeFigureOut">
               <a:rPr lang="en-US" smtClean="0"/>
-              <a:t>1/31/2024</a:t>
+              <a:t>2/2/2024</a:t>
             </a:fld>
             <a:endParaRPr lang="en-US"/>
           </a:p>
@@ -10340,7 +10469,7 @@
           <a:p>
             <a:fld id="{1405C4EA-9AE4-4CD8-88AE-B7C9EA33431D}" type="datetimeFigureOut">
               <a:rPr lang="en-US" smtClean="0"/>
-              <a:t>1/31/2024</a:t>
+              <a:t>2/2/2024</a:t>
             </a:fld>
             <a:endParaRPr lang="en-US"/>
           </a:p>
@@ -10572,7 +10701,7 @@
           <a:p>
             <a:fld id="{1405C4EA-9AE4-4CD8-88AE-B7C9EA33431D}" type="datetimeFigureOut">
               <a:rPr lang="en-US" smtClean="0"/>
-              <a:t>1/31/2024</a:t>
+              <a:t>2/2/2024</a:t>
             </a:fld>
             <a:endParaRPr lang="en-US"/>
           </a:p>
@@ -10939,7 +11068,7 @@
           <a:p>
             <a:fld id="{1405C4EA-9AE4-4CD8-88AE-B7C9EA33431D}" type="datetimeFigureOut">
               <a:rPr lang="en-US" smtClean="0"/>
-              <a:t>1/31/2024</a:t>
+              <a:t>2/2/2024</a:t>
             </a:fld>
             <a:endParaRPr lang="en-US"/>
           </a:p>
@@ -11057,7 +11186,7 @@
           <a:p>
             <a:fld id="{1405C4EA-9AE4-4CD8-88AE-B7C9EA33431D}" type="datetimeFigureOut">
               <a:rPr lang="en-US" smtClean="0"/>
-              <a:t>1/31/2024</a:t>
+              <a:t>2/2/2024</a:t>
             </a:fld>
             <a:endParaRPr lang="en-US"/>
           </a:p>
@@ -11152,7 +11281,7 @@
           <a:p>
             <a:fld id="{1405C4EA-9AE4-4CD8-88AE-B7C9EA33431D}" type="datetimeFigureOut">
               <a:rPr lang="en-US" smtClean="0"/>
-              <a:t>1/31/2024</a:t>
+              <a:t>2/2/2024</a:t>
             </a:fld>
             <a:endParaRPr lang="en-US"/>
           </a:p>
@@ -11429,7 +11558,7 @@
           <a:p>
             <a:fld id="{1405C4EA-9AE4-4CD8-88AE-B7C9EA33431D}" type="datetimeFigureOut">
               <a:rPr lang="en-US" smtClean="0"/>
-              <a:t>1/31/2024</a:t>
+              <a:t>2/2/2024</a:t>
             </a:fld>
             <a:endParaRPr lang="en-US"/>
           </a:p>
@@ -11686,7 +11815,7 @@
           <a:p>
             <a:fld id="{1405C4EA-9AE4-4CD8-88AE-B7C9EA33431D}" type="datetimeFigureOut">
               <a:rPr lang="en-US" smtClean="0"/>
-              <a:t>1/31/2024</a:t>
+              <a:t>2/2/2024</a:t>
             </a:fld>
             <a:endParaRPr lang="en-US"/>
           </a:p>
@@ -11899,7 +12028,7 @@
           <a:p>
             <a:fld id="{1405C4EA-9AE4-4CD8-88AE-B7C9EA33431D}" type="datetimeFigureOut">
               <a:rPr lang="en-US" smtClean="0"/>
-              <a:t>1/31/2024</a:t>
+              <a:t>2/2/2024</a:t>
             </a:fld>
             <a:endParaRPr lang="en-US"/>
           </a:p>
@@ -13779,9 +13908,16 @@
                   <a:srgbClr val="0070C0"/>
                 </a:solidFill>
                 <a:latin typeface="Arial Nova Cond" panose="020B0506020202020204" pitchFamily="34" charset="0"/>
+                <a:hlinkClick r:id="rId3"/>
               </a:rPr>
               <a:t>https://github.com/sebassilvap/Curso_30_Ejercicios_Python_2024.git</a:t>
             </a:r>
+            <a:endParaRPr lang="es-419" sz="2000" b="1" u="sng" dirty="0">
+              <a:solidFill>
+                <a:srgbClr val="0070C0"/>
+              </a:solidFill>
+              <a:latin typeface="Arial Nova Cond" panose="020B0506020202020204" pitchFamily="34" charset="0"/>
+            </a:endParaRPr>
           </a:p>
         </p:txBody>
       </p:sp>
@@ -14549,7 +14685,7 @@
           <p:nvPr>
             <p:extLst>
               <p:ext uri="{D42A27DB-BD31-4B8C-83A1-F6EECF244321}">
-                <p14:modId xmlns:p14="http://schemas.microsoft.com/office/powerpoint/2010/main" val="4188678280"/>
+                <p14:modId xmlns:p14="http://schemas.microsoft.com/office/powerpoint/2010/main" val="3203516877"/>
               </p:ext>
             </p:extLst>
           </p:nvPr>
@@ -14567,6 +14703,7 @@
       <p:pic>
         <p:nvPicPr>
           <p:cNvPr id="7" name="Picture 6">
+            <a:hlinkClick r:id="rId7"/>
             <a:extLst>
               <a:ext uri="{FF2B5EF4-FFF2-40B4-BE49-F238E27FC236}">
                 <a16:creationId xmlns:a16="http://schemas.microsoft.com/office/drawing/2014/main" id="{3819F57D-E9C9-EB96-2A81-DF3B7E06D350}"/>
@@ -14579,7 +14716,7 @@
           <p:nvPr/>
         </p:nvPicPr>
         <p:blipFill>
-          <a:blip r:embed="rId7"/>
+          <a:blip r:embed="rId8"/>
           <a:stretch>
             <a:fillRect/>
           </a:stretch>

</xml_diff>